<commit_message>
remove admin display leaderboard
</commit_message>
<xml_diff>
--- a/ppt/小游戲介紹.pptx
+++ b/ppt/小游戲介紹.pptx
@@ -112,6 +112,43 @@
     </p:ext>
   </p:extLst>
 </p:presentation>
+</file>
+
+<file path=ppt/changesInfos/changesInfo1.xml><?xml version="1.0" encoding="utf-8"?>
+<pc:chgInfo xmlns:a="http://schemas.openxmlformats.org/drawingml/2006/main" xmlns:r="http://schemas.openxmlformats.org/officeDocument/2006/relationships" xmlns:ac="http://schemas.microsoft.com/office/drawing/2013/main/command" xmlns:pc="http://schemas.microsoft.com/office/powerpoint/2013/main/command">
+  <pc:docChgLst>
+    <pc:chgData name="Lim Kelvin" userId="624f6ae12bb7b72b" providerId="LiveId" clId="{4E86DE64-E137-41D9-900E-0CF67EA461E6}"/>
+    <pc:docChg chg="modSld">
+      <pc:chgData name="Lim Kelvin" userId="624f6ae12bb7b72b" providerId="LiveId" clId="{4E86DE64-E137-41D9-900E-0CF67EA461E6}" dt="2024-12-22T15:00:33.715" v="2" actId="207"/>
+      <pc:docMkLst>
+        <pc:docMk/>
+      </pc:docMkLst>
+      <pc:sldChg chg="modSp mod">
+        <pc:chgData name="Lim Kelvin" userId="624f6ae12bb7b72b" providerId="LiveId" clId="{4E86DE64-E137-41D9-900E-0CF67EA461E6}" dt="2024-12-22T15:00:33.715" v="2" actId="207"/>
+        <pc:sldMkLst>
+          <pc:docMk/>
+          <pc:sldMk cId="2164878971" sldId="257"/>
+        </pc:sldMkLst>
+        <pc:spChg chg="mod">
+          <ac:chgData name="Lim Kelvin" userId="624f6ae12bb7b72b" providerId="LiveId" clId="{4E86DE64-E137-41D9-900E-0CF67EA461E6}" dt="2024-12-22T15:00:31.150" v="1" actId="207"/>
+          <ac:spMkLst>
+            <pc:docMk/>
+            <pc:sldMk cId="2164878971" sldId="257"/>
+            <ac:spMk id="9" creationId="{155B0ED0-8962-9732-D9DD-22FBF04BD141}"/>
+          </ac:spMkLst>
+        </pc:spChg>
+        <pc:spChg chg="mod">
+          <ac:chgData name="Lim Kelvin" userId="624f6ae12bb7b72b" providerId="LiveId" clId="{4E86DE64-E137-41D9-900E-0CF67EA461E6}" dt="2024-12-22T15:00:33.715" v="2" actId="207"/>
+          <ac:spMkLst>
+            <pc:docMk/>
+            <pc:sldMk cId="2164878971" sldId="257"/>
+            <ac:spMk id="11" creationId="{AB44A455-D962-5E58-B931-E339B23A7251}"/>
+          </ac:spMkLst>
+        </pc:spChg>
+      </pc:sldChg>
+    </pc:docChg>
+  </pc:docChgLst>
+</pc:chgInfo>
 </file>
 
 <file path=ppt/slideLayouts/slideLayout1.xml><?xml version="1.0" encoding="utf-8"?>
@@ -3910,13 +3947,13 @@
   <p:clrMapOvr>
     <a:masterClrMapping/>
   </p:clrMapOvr>
-  <mc:AlternateContent xmlns:mc="http://schemas.openxmlformats.org/markup-compatibility/2006">
-    <mc:Choice xmlns:p159="http://schemas.microsoft.com/office/powerpoint/2015/09/main" Requires="p159">
+  <mc:AlternateContent xmlns:mc="http://schemas.openxmlformats.org/markup-compatibility/2006" xmlns:p159="http://schemas.microsoft.com/office/powerpoint/2015/09/main">
+    <mc:Choice Requires="p159">
       <p:transition xmlns:p14="http://schemas.microsoft.com/office/powerpoint/2010/main" spd="slow" p14:dur="2000">
         <p159:morph option="byObject"/>
       </p:transition>
     </mc:Choice>
-    <mc:Fallback>
+    <mc:Fallback xmlns="">
       <p:transition spd="slow">
         <p:fade/>
       </p:transition>
@@ -4184,6 +4221,12 @@
             <a:r>
               <a:rPr lang="zh-CN" altLang="en-US" dirty="0">
                 <a:ln w="0"/>
+                <a:solidFill>
+                  <a:schemeClr val="accent1">
+                    <a:lumMod val="20000"/>
+                    <a:lumOff val="80000"/>
+                  </a:schemeClr>
+                </a:solidFill>
                 <a:effectLst>
                   <a:outerShdw blurRad="38100" dist="19050" dir="2700000" algn="tl" rotWithShape="0">
                     <a:schemeClr val="dk1">
@@ -4288,6 +4331,12 @@
             <a:r>
               <a:rPr lang="zh-CN" altLang="en-US" dirty="0">
                 <a:ln w="0"/>
+                <a:solidFill>
+                  <a:schemeClr val="accent1">
+                    <a:lumMod val="20000"/>
+                    <a:lumOff val="80000"/>
+                  </a:schemeClr>
+                </a:solidFill>
                 <a:effectLst>
                   <a:outerShdw blurRad="38100" dist="19050" dir="2700000" algn="tl" rotWithShape="0">
                     <a:schemeClr val="dk1">
@@ -4301,6 +4350,12 @@
             <a:r>
               <a:rPr lang="en-US" altLang="zh-CN" dirty="0">
                 <a:ln w="0"/>
+                <a:solidFill>
+                  <a:schemeClr val="accent1">
+                    <a:lumMod val="20000"/>
+                    <a:lumOff val="80000"/>
+                  </a:schemeClr>
+                </a:solidFill>
                 <a:effectLst>
                   <a:outerShdw blurRad="38100" dist="19050" dir="2700000" algn="tl" rotWithShape="0">
                     <a:schemeClr val="dk1">
@@ -4314,6 +4369,12 @@
             <a:r>
               <a:rPr lang="zh-CN" altLang="en-US" dirty="0">
                 <a:ln w="0"/>
+                <a:solidFill>
+                  <a:schemeClr val="accent1">
+                    <a:lumMod val="20000"/>
+                    <a:lumOff val="80000"/>
+                  </a:schemeClr>
+                </a:solidFill>
                 <a:effectLst>
                   <a:outerShdw blurRad="38100" dist="19050" dir="2700000" algn="tl" rotWithShape="0">
                     <a:schemeClr val="dk1">
@@ -4327,6 +4388,12 @@
             <a:r>
               <a:rPr lang="en-US" altLang="zh-CN" dirty="0">
                 <a:ln w="0"/>
+                <a:solidFill>
+                  <a:schemeClr val="accent1">
+                    <a:lumMod val="20000"/>
+                    <a:lumOff val="80000"/>
+                  </a:schemeClr>
+                </a:solidFill>
                 <a:effectLst>
                   <a:outerShdw blurRad="38100" dist="19050" dir="2700000" algn="tl" rotWithShape="0">
                     <a:schemeClr val="dk1">
@@ -4340,6 +4407,12 @@
             <a:r>
               <a:rPr lang="zh-CN" altLang="en-US" dirty="0">
                 <a:ln w="0"/>
+                <a:solidFill>
+                  <a:schemeClr val="accent1">
+                    <a:lumMod val="20000"/>
+                    <a:lumOff val="80000"/>
+                  </a:schemeClr>
+                </a:solidFill>
                 <a:effectLst>
                   <a:outerShdw blurRad="38100" dist="19050" dir="2700000" algn="tl" rotWithShape="0">
                     <a:schemeClr val="dk1">
@@ -4353,6 +4426,12 @@
             <a:r>
               <a:rPr lang="zh-TW" altLang="en-US" dirty="0">
                 <a:ln w="0"/>
+                <a:solidFill>
+                  <a:schemeClr val="accent1">
+                    <a:lumMod val="20000"/>
+                    <a:lumOff val="80000"/>
+                  </a:schemeClr>
+                </a:solidFill>
                 <a:effectLst>
                   <a:outerShdw blurRad="38100" dist="19050" dir="2700000" algn="tl" rotWithShape="0">
                     <a:schemeClr val="dk1">
@@ -4365,6 +4444,12 @@
             </a:r>
             <a:endParaRPr lang="en-US" altLang="zh-TW" dirty="0">
               <a:ln w="0"/>
+              <a:solidFill>
+                <a:schemeClr val="accent1">
+                  <a:lumMod val="20000"/>
+                  <a:lumOff val="80000"/>
+                </a:schemeClr>
+              </a:solidFill>
               <a:effectLst>
                 <a:outerShdw blurRad="38100" dist="19050" dir="2700000" algn="tl" rotWithShape="0">
                   <a:schemeClr val="dk1">
@@ -4378,6 +4463,12 @@
             <a:r>
               <a:rPr kumimoji="0" lang="zh-CN" altLang="en-US" i="0" u="none" strike="noStrike" normalizeH="0" baseline="0" dirty="0">
                 <a:ln w="0"/>
+                <a:solidFill>
+                  <a:schemeClr val="accent1">
+                    <a:lumMod val="20000"/>
+                    <a:lumOff val="80000"/>
+                  </a:schemeClr>
+                </a:solidFill>
                 <a:effectLst>
                   <a:outerShdw blurRad="38100" dist="19050" dir="2700000" algn="tl" rotWithShape="0">
                     <a:schemeClr val="dk1">
@@ -4392,6 +4483,12 @@
             <a:r>
               <a:rPr kumimoji="0" lang="zh-CN" altLang="zh-CN" i="0" u="none" strike="noStrike" normalizeH="0" baseline="0" dirty="0">
                 <a:ln w="0"/>
+                <a:solidFill>
+                  <a:schemeClr val="accent1">
+                    <a:lumMod val="20000"/>
+                    <a:lumOff val="80000"/>
+                  </a:schemeClr>
+                </a:solidFill>
                 <a:effectLst>
                   <a:outerShdw blurRad="38100" dist="19050" dir="2700000" algn="tl" rotWithShape="0">
                     <a:schemeClr val="dk1">
@@ -4406,6 +4503,12 @@
             <a:r>
               <a:rPr kumimoji="0" lang="zh-CN" altLang="en-US" i="0" u="none" strike="noStrike" normalizeH="0" baseline="0" dirty="0">
                 <a:ln w="0"/>
+                <a:solidFill>
+                  <a:schemeClr val="accent1">
+                    <a:lumMod val="20000"/>
+                    <a:lumOff val="80000"/>
+                  </a:schemeClr>
+                </a:solidFill>
                 <a:effectLst>
                   <a:outerShdw blurRad="38100" dist="19050" dir="2700000" algn="tl" rotWithShape="0">
                     <a:schemeClr val="dk1">
@@ -4420,6 +4523,12 @@
             <a:r>
               <a:rPr kumimoji="0" lang="en-US" altLang="zh-CN" i="0" u="none" strike="noStrike" normalizeH="0" baseline="0" dirty="0">
                 <a:ln w="0"/>
+                <a:solidFill>
+                  <a:schemeClr val="accent1">
+                    <a:lumMod val="20000"/>
+                    <a:lumOff val="80000"/>
+                  </a:schemeClr>
+                </a:solidFill>
                 <a:effectLst>
                   <a:outerShdw blurRad="38100" dist="19050" dir="2700000" algn="tl" rotWithShape="0">
                     <a:schemeClr val="dk1">
@@ -4433,6 +4542,12 @@
             </a:r>
             <a:endParaRPr lang="zh-CN" altLang="en-US" dirty="0">
               <a:ln w="0"/>
+              <a:solidFill>
+                <a:schemeClr val="accent1">
+                  <a:lumMod val="20000"/>
+                  <a:lumOff val="80000"/>
+                </a:schemeClr>
+              </a:solidFill>
               <a:effectLst>
                 <a:outerShdw blurRad="38100" dist="19050" dir="2700000" algn="tl" rotWithShape="0">
                   <a:schemeClr val="dk1">
@@ -4454,13 +4569,13 @@
   <p:clrMapOvr>
     <a:masterClrMapping/>
   </p:clrMapOvr>
-  <mc:AlternateContent xmlns:mc="http://schemas.openxmlformats.org/markup-compatibility/2006">
-    <mc:Choice xmlns:p15="http://schemas.microsoft.com/office/powerpoint/2012/main" Requires="p15">
+  <mc:AlternateContent xmlns:mc="http://schemas.openxmlformats.org/markup-compatibility/2006" xmlns:p15="http://schemas.microsoft.com/office/powerpoint/2012/main">
+    <mc:Choice Requires="p15">
       <p:transition xmlns:p14="http://schemas.microsoft.com/office/powerpoint/2010/main" spd="slow" p14:dur="2000">
         <p15:prstTrans prst="crush"/>
       </p:transition>
     </mc:Choice>
-    <mc:Fallback>
+    <mc:Fallback xmlns="">
       <p:transition spd="slow">
         <p:fade/>
       </p:transition>

</xml_diff>